<commit_message>
Aanvullingen module4 - figuren en backup aia files
</commit_message>
<xml_diff>
--- a/latex_innovationLab/bronmateriaal/frontcover.pptx
+++ b/latex_innovationLab/bronmateriaal/frontcover.pptx
@@ -243,7 +243,7 @@
           <a:p>
             <a:fld id="{4CF1BCA1-464E-4743-B321-325D148A9CF4}" type="datetimeFigureOut">
               <a:rPr lang="en-US" smtClean="0"/>
-              <a:t>12/10/2018</a:t>
+              <a:t>1/11/2019</a:t>
             </a:fld>
             <a:endParaRPr lang="en-US"/>
           </a:p>
@@ -413,7 +413,7 @@
           <a:p>
             <a:fld id="{4CF1BCA1-464E-4743-B321-325D148A9CF4}" type="datetimeFigureOut">
               <a:rPr lang="en-US" smtClean="0"/>
-              <a:t>12/10/2018</a:t>
+              <a:t>1/11/2019</a:t>
             </a:fld>
             <a:endParaRPr lang="en-US"/>
           </a:p>
@@ -593,7 +593,7 @@
           <a:p>
             <a:fld id="{4CF1BCA1-464E-4743-B321-325D148A9CF4}" type="datetimeFigureOut">
               <a:rPr lang="en-US" smtClean="0"/>
-              <a:t>12/10/2018</a:t>
+              <a:t>1/11/2019</a:t>
             </a:fld>
             <a:endParaRPr lang="en-US"/>
           </a:p>
@@ -763,7 +763,7 @@
           <a:p>
             <a:fld id="{4CF1BCA1-464E-4743-B321-325D148A9CF4}" type="datetimeFigureOut">
               <a:rPr lang="en-US" smtClean="0"/>
-              <a:t>12/10/2018</a:t>
+              <a:t>1/11/2019</a:t>
             </a:fld>
             <a:endParaRPr lang="en-US"/>
           </a:p>
@@ -1007,7 +1007,7 @@
           <a:p>
             <a:fld id="{4CF1BCA1-464E-4743-B321-325D148A9CF4}" type="datetimeFigureOut">
               <a:rPr lang="en-US" smtClean="0"/>
-              <a:t>12/10/2018</a:t>
+              <a:t>1/11/2019</a:t>
             </a:fld>
             <a:endParaRPr lang="en-US"/>
           </a:p>
@@ -1239,7 +1239,7 @@
           <a:p>
             <a:fld id="{4CF1BCA1-464E-4743-B321-325D148A9CF4}" type="datetimeFigureOut">
               <a:rPr lang="en-US" smtClean="0"/>
-              <a:t>12/10/2018</a:t>
+              <a:t>1/11/2019</a:t>
             </a:fld>
             <a:endParaRPr lang="en-US"/>
           </a:p>
@@ -1606,7 +1606,7 @@
           <a:p>
             <a:fld id="{4CF1BCA1-464E-4743-B321-325D148A9CF4}" type="datetimeFigureOut">
               <a:rPr lang="en-US" smtClean="0"/>
-              <a:t>12/10/2018</a:t>
+              <a:t>1/11/2019</a:t>
             </a:fld>
             <a:endParaRPr lang="en-US"/>
           </a:p>
@@ -1724,7 +1724,7 @@
           <a:p>
             <a:fld id="{4CF1BCA1-464E-4743-B321-325D148A9CF4}" type="datetimeFigureOut">
               <a:rPr lang="en-US" smtClean="0"/>
-              <a:t>12/10/2018</a:t>
+              <a:t>1/11/2019</a:t>
             </a:fld>
             <a:endParaRPr lang="en-US"/>
           </a:p>
@@ -1819,7 +1819,7 @@
           <a:p>
             <a:fld id="{4CF1BCA1-464E-4743-B321-325D148A9CF4}" type="datetimeFigureOut">
               <a:rPr lang="en-US" smtClean="0"/>
-              <a:t>12/10/2018</a:t>
+              <a:t>1/11/2019</a:t>
             </a:fld>
             <a:endParaRPr lang="en-US"/>
           </a:p>
@@ -2096,7 +2096,7 @@
           <a:p>
             <a:fld id="{4CF1BCA1-464E-4743-B321-325D148A9CF4}" type="datetimeFigureOut">
               <a:rPr lang="en-US" smtClean="0"/>
-              <a:t>12/10/2018</a:t>
+              <a:t>1/11/2019</a:t>
             </a:fld>
             <a:endParaRPr lang="en-US"/>
           </a:p>
@@ -2353,7 +2353,7 @@
           <a:p>
             <a:fld id="{4CF1BCA1-464E-4743-B321-325D148A9CF4}" type="datetimeFigureOut">
               <a:rPr lang="en-US" smtClean="0"/>
-              <a:t>12/10/2018</a:t>
+              <a:t>1/11/2019</a:t>
             </a:fld>
             <a:endParaRPr lang="en-US"/>
           </a:p>
@@ -2566,7 +2566,7 @@
           <a:p>
             <a:fld id="{4CF1BCA1-464E-4743-B321-325D148A9CF4}" type="datetimeFigureOut">
               <a:rPr lang="en-US" smtClean="0"/>
-              <a:t>12/10/2018</a:t>
+              <a:t>1/11/2019</a:t>
             </a:fld>
             <a:endParaRPr lang="en-US"/>
           </a:p>
@@ -3204,7 +3204,7 @@
         </p:spPr>
         <p:txBody>
           <a:bodyPr vert="horz" lIns="89162" tIns="44581" rIns="89162" bIns="44581" rtlCol="0" anchor="b">
-            <a:normAutofit fontScale="85000" lnSpcReduction="10000"/>
+            <a:normAutofit fontScale="77500" lnSpcReduction="20000"/>
           </a:bodyPr>
           <a:lstStyle>
             <a:lvl1pPr algn="ctr" defTabSz="685800" rtl="0" eaLnBrk="1" latinLnBrk="0" hangingPunct="1">
@@ -3239,7 +3239,17 @@
                 <a:latin typeface="Arial" panose="020B0604020202020204" pitchFamily="34" charset="0"/>
                 <a:cs typeface="Arial" panose="020B0604020202020204" pitchFamily="34" charset="0"/>
               </a:rPr>
-              <a:t>Hartslag monitor altijd op zak</a:t>
+              <a:t>Je hartslagmonitor </a:t>
+            </a:r>
+            <a:r>
+              <a:rPr lang="nl-BE" sz="3510" b="1" dirty="0" smtClean="0">
+                <a:solidFill>
+                  <a:schemeClr val="bg1"/>
+                </a:solidFill>
+                <a:latin typeface="Arial" panose="020B0604020202020204" pitchFamily="34" charset="0"/>
+                <a:cs typeface="Arial" panose="020B0604020202020204" pitchFamily="34" charset="0"/>
+              </a:rPr>
+              <a:t>altijd op zak</a:t>
             </a:r>
             <a:endParaRPr lang="en-US" sz="3510" b="1" dirty="0">
               <a:solidFill>

</xml_diff>